<commit_message>
Adding Github link for Sources on Data and Charts shown in PowerPoint
</commit_message>
<xml_diff>
--- a/FinWin Final Presentation.pptx
+++ b/FinWin Final Presentation.pptx
@@ -259,7 +259,7 @@
   </p:defaultTextStyle>
   <p:extLst>
     <p:ext uri="GoogleSlidesCustomDataVersion2">
-      <go:slidesCustomData xmlns:go="http://customooxmlschemas.google.com/" r:id="rId18" roundtripDataSignature="AMtx7mjjyyrhAcx5VC0L5Zo2x3/ojP0dfA=="/>
+      <go:slidesCustomData xmlns:go="http://customooxmlschemas.google.com/" r:id="rId18" roundtripDataSignature="AMtx7mhWRY1XXypI1wTxrzPf+NfELvws9g=="/>
     </p:ext>
   </p:extLst>
 </p:presentation>
@@ -795,7 +795,7 @@
   <p:cSld>
     <p:spTree>
       <p:nvGrpSpPr>
-        <p:cNvPr id="190" name="Shape 190"/>
+        <p:cNvPr id="191" name="Shape 191"/>
         <p:cNvGrpSpPr/>
         <p:nvPr/>
       </p:nvGrpSpPr>
@@ -809,7 +809,7 @@
       </p:grpSpPr>
       <p:sp>
         <p:nvSpPr>
-          <p:cNvPr id="191" name="Google Shape;191;g6bdf15e9aee03fa4_354:notes"/>
+          <p:cNvPr id="192" name="Google Shape;192;g6bdf15e9aee03fa4_354:notes"/>
           <p:cNvSpPr txBox="1"/>
           <p:nvPr>
             <p:ph idx="1" type="body"/>
@@ -848,7 +848,7 @@
       </p:sp>
       <p:sp>
         <p:nvSpPr>
-          <p:cNvPr id="192" name="Google Shape;192;g6bdf15e9aee03fa4_354:notes"/>
+          <p:cNvPr id="193" name="Google Shape;193;g6bdf15e9aee03fa4_354:notes"/>
           <p:cNvSpPr/>
           <p:nvPr>
             <p:ph idx="2" type="sldImg"/>
@@ -1677,7 +1677,7 @@
   <p:cSld>
     <p:spTree>
       <p:nvGrpSpPr>
-        <p:cNvPr id="185" name="Shape 185"/>
+        <p:cNvPr id="186" name="Shape 186"/>
         <p:cNvGrpSpPr/>
         <p:nvPr/>
       </p:nvGrpSpPr>
@@ -1691,7 +1691,7 @@
       </p:grpSpPr>
       <p:sp>
         <p:nvSpPr>
-          <p:cNvPr id="186" name="Google Shape;186;g2884d7aac9f_0_0:notes"/>
+          <p:cNvPr id="187" name="Google Shape;187;g2884d7aac9f_0_0:notes"/>
           <p:cNvSpPr/>
           <p:nvPr>
             <p:ph idx="2" type="sldImg"/>
@@ -1726,7 +1726,7 @@
       </p:sp>
       <p:sp>
         <p:nvSpPr>
-          <p:cNvPr id="187" name="Google Shape;187;g2884d7aac9f_0_0:notes"/>
+          <p:cNvPr id="188" name="Google Shape;188;g2884d7aac9f_0_0:notes"/>
           <p:cNvSpPr txBox="1"/>
           <p:nvPr>
             <p:ph idx="1" type="body"/>
@@ -12448,7 +12448,7 @@
         <p:spPr>
           <a:xfrm>
             <a:off x="20" y="10"/>
-            <a:ext cx="12191980" cy="6857990"/>
+            <a:ext cx="12191980" cy="6857989"/>
           </a:xfrm>
           <a:prstGeom prst="rect">
             <a:avLst/>
@@ -12560,7 +12560,7 @@
             <a:tbl>
               <a:tblPr bandRow="1" firstRow="1">
                 <a:noFill/>
-                <a:tableStyleId>{2F31F3DE-97FC-4148-86D6-35209AC14683}</a:tableStyleId>
+                <a:tableStyleId>{6763ACE3-701D-4AE0-82C7-7919AC872DC1}</a:tableStyleId>
               </a:tblPr>
               <a:tblGrid>
                 <a:gridCol w="8558275"/>
@@ -12642,7 +12642,7 @@
   <p:cSld>
     <p:spTree>
       <p:nvGrpSpPr>
-        <p:cNvPr id="193" name="Shape 193"/>
+        <p:cNvPr id="194" name="Shape 194"/>
         <p:cNvGrpSpPr/>
         <p:nvPr/>
       </p:nvGrpSpPr>
@@ -12656,7 +12656,7 @@
       </p:grpSpPr>
       <p:sp>
         <p:nvSpPr>
-          <p:cNvPr id="194" name="Google Shape;194;g6bdf15e9aee03fa4_354"/>
+          <p:cNvPr id="195" name="Google Shape;195;g6bdf15e9aee03fa4_354"/>
           <p:cNvSpPr txBox="1"/>
           <p:nvPr>
             <p:ph idx="4294967295" type="title"/>
@@ -12716,7 +12716,7 @@
       </p:sp>
       <p:pic>
         <p:nvPicPr>
-          <p:cNvPr id="195" name="Google Shape;195;g6bdf15e9aee03fa4_354"/>
+          <p:cNvPr id="196" name="Google Shape;196;g6bdf15e9aee03fa4_354"/>
           <p:cNvPicPr preferRelativeResize="0"/>
           <p:nvPr/>
         </p:nvPicPr>
@@ -15877,7 +15877,7 @@
         </p:blipFill>
         <p:spPr>
           <a:xfrm>
-            <a:off x="6699413" y="160000"/>
+            <a:off x="6775613" y="160000"/>
             <a:ext cx="4895166" cy="3200402"/>
           </a:xfrm>
           <a:prstGeom prst="rect">
@@ -15990,7 +15990,7 @@
             <a:tbl>
               <a:tblPr bandRow="1" firstRow="1">
                 <a:noFill/>
-                <a:tableStyleId>{743463DD-3EDF-4962-A0EA-82F281555078}</a:tableStyleId>
+                <a:tableStyleId>{2ED2CC24-B568-4593-B0B5-E88AEC9FE7BD}</a:tableStyleId>
               </a:tblPr>
               <a:tblGrid>
                 <a:gridCol w="3686350"/>
@@ -16082,7 +16082,7 @@
             <a:tbl>
               <a:tblPr bandRow="1" firstRow="1">
                 <a:noFill/>
-                <a:tableStyleId>{743463DD-3EDF-4962-A0EA-82F281555078}</a:tableStyleId>
+                <a:tableStyleId>{2ED2CC24-B568-4593-B0B5-E88AEC9FE7BD}</a:tableStyleId>
               </a:tblPr>
               <a:tblGrid>
                 <a:gridCol w="1537775"/>
@@ -16243,7 +16243,7 @@
         </p:nvSpPr>
         <p:spPr>
           <a:xfrm>
-            <a:off x="1581912" y="2638044"/>
+            <a:off x="1581912" y="2395669"/>
             <a:ext cx="4271700" cy="3102000"/>
           </a:xfrm>
           <a:prstGeom prst="rect">
@@ -16374,7 +16374,7 @@
         </p:nvSpPr>
         <p:spPr>
           <a:xfrm>
-            <a:off x="7416840" y="2638044"/>
+            <a:off x="6635790" y="2395669"/>
             <a:ext cx="4270200" cy="3102000"/>
           </a:xfrm>
           <a:prstGeom prst="rect">
@@ -16601,6 +16601,96 @@
               <a:t>Speculative Strategies</a:t>
             </a:r>
             <a:endParaRPr b="1"/>
+          </a:p>
+        </p:txBody>
+      </p:sp>
+      <p:sp>
+        <p:nvSpPr>
+          <p:cNvPr id="185" name="Google Shape;185;g6bdf15e9aee03fa4_177"/>
+          <p:cNvSpPr txBox="1"/>
+          <p:nvPr/>
+        </p:nvSpPr>
+        <p:spPr>
+          <a:xfrm>
+            <a:off x="3448500" y="5740050"/>
+            <a:ext cx="5295000" cy="714900"/>
+          </a:xfrm>
+          <a:prstGeom prst="rect">
+            <a:avLst/>
+          </a:prstGeom>
+          <a:noFill/>
+          <a:ln>
+            <a:noFill/>
+          </a:ln>
+        </p:spPr>
+        <p:txBody>
+          <a:bodyPr anchorCtr="0" anchor="t" bIns="91425" lIns="91425" spcFirstLastPara="1" rIns="91425" wrap="square" tIns="91425">
+            <a:noAutofit/>
+          </a:bodyPr>
+          <a:lstStyle/>
+          <a:p>
+            <a:pPr indent="0" lvl="0" marL="0" rtl="0" algn="l">
+              <a:spcBef>
+                <a:spcPts val="0"/>
+              </a:spcBef>
+              <a:spcAft>
+                <a:spcPts val="0"/>
+              </a:spcAft>
+              <a:buNone/>
+            </a:pPr>
+            <a:r>
+              <a:rPr b="1" lang="en-US" sz="1800">
+                <a:solidFill>
+                  <a:srgbClr val="FF0000"/>
+                </a:solidFill>
+                <a:latin typeface="Gill Sans"/>
+                <a:ea typeface="Gill Sans"/>
+                <a:cs typeface="Gill Sans"/>
+                <a:sym typeface="Gill Sans"/>
+              </a:rPr>
+              <a:t>Sources can be found on Github!</a:t>
+            </a:r>
+            <a:endParaRPr b="1" sz="1800">
+              <a:solidFill>
+                <a:srgbClr val="FF0000"/>
+              </a:solidFill>
+              <a:latin typeface="Gill Sans"/>
+              <a:ea typeface="Gill Sans"/>
+              <a:cs typeface="Gill Sans"/>
+              <a:sym typeface="Gill Sans"/>
+            </a:endParaRPr>
+          </a:p>
+          <a:p>
+            <a:pPr indent="0" lvl="0" marL="0" rtl="0" algn="l">
+              <a:spcBef>
+                <a:spcPts val="0"/>
+              </a:spcBef>
+              <a:spcAft>
+                <a:spcPts val="0"/>
+              </a:spcAft>
+              <a:buNone/>
+            </a:pPr>
+            <a:r>
+              <a:rPr b="1" lang="en-US" sz="1800">
+                <a:solidFill>
+                  <a:srgbClr val="FF0000"/>
+                </a:solidFill>
+                <a:latin typeface="Gill Sans"/>
+                <a:ea typeface="Gill Sans"/>
+                <a:cs typeface="Gill Sans"/>
+                <a:sym typeface="Gill Sans"/>
+              </a:rPr>
+              <a:t>https://github.com/fintech-lex/finance-starterkit</a:t>
+            </a:r>
+            <a:endParaRPr b="1" sz="1800">
+              <a:solidFill>
+                <a:srgbClr val="FF0000"/>
+              </a:solidFill>
+              <a:latin typeface="Gill Sans"/>
+              <a:ea typeface="Gill Sans"/>
+              <a:cs typeface="Gill Sans"/>
+              <a:sym typeface="Gill Sans"/>
+            </a:endParaRPr>
           </a:p>
         </p:txBody>
       </p:sp>
@@ -16629,7 +16719,7 @@
     </p:bg>
     <p:spTree>
       <p:nvGrpSpPr>
-        <p:cNvPr id="188" name="Shape 188"/>
+        <p:cNvPr id="189" name="Shape 189"/>
         <p:cNvGrpSpPr/>
         <p:nvPr/>
       </p:nvGrpSpPr>
@@ -16643,7 +16733,7 @@
       </p:grpSpPr>
       <p:sp>
         <p:nvSpPr>
-          <p:cNvPr id="189" name="Google Shape;189;g2884d7aac9f_0_0"/>
+          <p:cNvPr id="190" name="Google Shape;190;g2884d7aac9f_0_0"/>
           <p:cNvSpPr txBox="1"/>
           <p:nvPr>
             <p:ph type="ctrTitle"/>

</xml_diff>